<commit_message>
add slides on server architecture
</commit_message>
<xml_diff>
--- a/docs/final_presentation_tmas.pptx
+++ b/docs/final_presentation_tmas.pptx
@@ -11,6 +11,10 @@
     <p:sldId id="259" r:id="rId5"/>
     <p:sldId id="258" r:id="rId6"/>
     <p:sldId id="261" r:id="rId7"/>
+    <p:sldId id="262" r:id="rId8"/>
+    <p:sldId id="263" r:id="rId9"/>
+    <p:sldId id="265" r:id="rId10"/>
+    <p:sldId id="264" r:id="rId11"/>
   </p:sldIdLst>
   <p:sldSz cx="9144000" cy="6858000" type="screen4x3"/>
   <p:notesSz cx="6858000" cy="9144000"/>
@@ -4867,6 +4871,490 @@
 </p:sld>
 </file>
 
+<file path=ppt/slides/slide10.xml><?xml version="1.0" encoding="utf-8"?>
+<p:sld xmlns:a="http://schemas.openxmlformats.org/drawingml/2006/main" xmlns:r="http://schemas.openxmlformats.org/officeDocument/2006/relationships" xmlns:p="http://schemas.openxmlformats.org/presentationml/2006/main">
+  <p:cSld>
+    <p:spTree>
+      <p:nvGrpSpPr>
+        <p:cNvPr id="1" name=""/>
+        <p:cNvGrpSpPr/>
+        <p:nvPr/>
+      </p:nvGrpSpPr>
+      <p:grpSpPr>
+        <a:xfrm>
+          <a:off x="0" y="0"/>
+          <a:ext cx="0" cy="0"/>
+          <a:chOff x="0" y="0"/>
+          <a:chExt cx="0" cy="0"/>
+        </a:xfrm>
+      </p:grpSpPr>
+      <p:sp>
+        <p:nvSpPr>
+          <p:cNvPr id="2" name="Content Placeholder 1"/>
+          <p:cNvSpPr>
+            <a:spLocks noGrp="1"/>
+          </p:cNvSpPr>
+          <p:nvPr>
+            <p:ph idx="1"/>
+          </p:nvPr>
+        </p:nvSpPr>
+        <p:spPr>
+          <a:xfrm>
+            <a:off x="4495800" y="1481328"/>
+            <a:ext cx="4191000" cy="4525963"/>
+          </a:xfrm>
+        </p:spPr>
+        <p:txBody>
+          <a:bodyPr>
+            <a:normAutofit/>
+          </a:bodyPr>
+          <a:lstStyle/>
+          <a:p>
+            <a:pPr lvl="0" algn="ctr">
+              <a:buNone/>
+              <a:defRPr/>
+            </a:pPr>
+            <a:r>
+              <a:rPr lang="en-US" sz="2800" u="sng" dirty="0" smtClean="0"/>
+              <a:t>Ben</a:t>
+            </a:r>
+          </a:p>
+          <a:p>
+            <a:pPr lvl="0">
+              <a:buFont typeface="Wingdings" pitchFamily="2" charset="2"/>
+              <a:buChar char="§"/>
+              <a:defRPr/>
+            </a:pPr>
+            <a:r>
+              <a:rPr lang="en-US" sz="2800" dirty="0" smtClean="0"/>
+              <a:t>Device Design</a:t>
+            </a:r>
+          </a:p>
+          <a:p>
+            <a:pPr lvl="0">
+              <a:buFont typeface="Wingdings" pitchFamily="2" charset="2"/>
+              <a:buChar char="§"/>
+              <a:defRPr/>
+            </a:pPr>
+            <a:r>
+              <a:rPr lang="en-US" sz="2800" dirty="0" smtClean="0"/>
+              <a:t>API </a:t>
+            </a:r>
+          </a:p>
+          <a:p>
+            <a:pPr lvl="0">
+              <a:buFont typeface="Wingdings" pitchFamily="2" charset="2"/>
+              <a:buChar char="§"/>
+              <a:defRPr/>
+            </a:pPr>
+            <a:r>
+              <a:rPr lang="en-US" sz="2800" dirty="0" smtClean="0"/>
+              <a:t>Build System</a:t>
+            </a:r>
+          </a:p>
+          <a:p>
+            <a:pPr lvl="0">
+              <a:buFont typeface="Wingdings" pitchFamily="2" charset="2"/>
+              <a:buChar char="§"/>
+              <a:defRPr/>
+            </a:pPr>
+            <a:r>
+              <a:rPr lang="en-US" sz="2800" dirty="0" smtClean="0"/>
+              <a:t>Hardware requirements and implementation</a:t>
+            </a:r>
+          </a:p>
+          <a:p>
+            <a:pPr lvl="0">
+              <a:buFont typeface="Wingdings" pitchFamily="2" charset="2"/>
+              <a:buChar char="§"/>
+              <a:defRPr/>
+            </a:pPr>
+            <a:endParaRPr lang="en-US" sz="2800" dirty="0" smtClean="0"/>
+          </a:p>
+        </p:txBody>
+      </p:sp>
+      <p:sp>
+        <p:nvSpPr>
+          <p:cNvPr id="3" name="Title 2"/>
+          <p:cNvSpPr>
+            <a:spLocks noGrp="1"/>
+          </p:cNvSpPr>
+          <p:nvPr>
+            <p:ph type="title"/>
+          </p:nvPr>
+        </p:nvSpPr>
+        <p:spPr/>
+        <p:txBody>
+          <a:bodyPr/>
+          <a:lstStyle/>
+          <a:p>
+            <a:pPr algn="ctr"/>
+            <a:r>
+              <a:rPr lang="en-US" b="0" u="sng" dirty="0" smtClean="0">
+                <a:latin typeface="Alien Encounters Solid" pitchFamily="2" charset="0"/>
+              </a:rPr>
+              <a:t>Individual </a:t>
+            </a:r>
+            <a:r>
+              <a:rPr lang="en-US" b="0" u="sng" dirty="0" err="1" smtClean="0">
+                <a:latin typeface="Alien Encounters Solid" pitchFamily="2" charset="0"/>
+              </a:rPr>
+              <a:t>responisbilities</a:t>
+            </a:r>
+            <a:endParaRPr lang="en-US" b="0" dirty="0">
+              <a:latin typeface="Lucida Console" pitchFamily="49" charset="0"/>
+            </a:endParaRPr>
+          </a:p>
+        </p:txBody>
+      </p:sp>
+      <p:sp>
+        <p:nvSpPr>
+          <p:cNvPr id="4" name="Content Placeholder 1"/>
+          <p:cNvSpPr txBox="1">
+            <a:spLocks/>
+          </p:cNvSpPr>
+          <p:nvPr/>
+        </p:nvSpPr>
+        <p:spPr>
+          <a:xfrm>
+            <a:off x="228600" y="1600200"/>
+            <a:ext cx="4191000" cy="4525963"/>
+          </a:xfrm>
+          <a:prstGeom prst="rect">
+            <a:avLst/>
+          </a:prstGeom>
+        </p:spPr>
+        <p:txBody>
+          <a:bodyPr vert="horz">
+            <a:normAutofit/>
+          </a:bodyPr>
+          <a:lstStyle/>
+          <a:p>
+            <a:pPr marL="365760" marR="0" lvl="0" indent="-256032" algn="ctr" defTabSz="914400" rtl="0" eaLnBrk="1" fontAlgn="auto" latinLnBrk="0" hangingPunct="1">
+              <a:lnSpc>
+                <a:spcPct val="100000"/>
+              </a:lnSpc>
+              <a:spcBef>
+                <a:spcPts val="400"/>
+              </a:spcBef>
+              <a:spcAft>
+                <a:spcPts val="0"/>
+              </a:spcAft>
+              <a:buClr>
+                <a:schemeClr val="accent1"/>
+              </a:buClr>
+              <a:buSzPct val="68000"/>
+              <a:tabLst/>
+              <a:defRPr/>
+            </a:pPr>
+            <a:r>
+              <a:rPr kumimoji="0" lang="en-US" sz="2800" b="0" i="0" u="sng" strike="noStrike" kern="1200" cap="none" spc="0" normalizeH="0" baseline="0" noProof="0" dirty="0" smtClean="0">
+                <a:ln>
+                  <a:noFill/>
+                </a:ln>
+                <a:solidFill>
+                  <a:schemeClr val="tx1"/>
+                </a:solidFill>
+                <a:effectLst/>
+                <a:uLnTx/>
+                <a:uFillTx/>
+                <a:latin typeface="+mn-lt"/>
+                <a:ea typeface="+mn-ea"/>
+                <a:cs typeface="+mn-cs"/>
+              </a:rPr>
+              <a:t>Thomas</a:t>
+            </a:r>
+          </a:p>
+          <a:p>
+            <a:pPr marL="365760" marR="0" lvl="0" indent="-256032" defTabSz="914400" rtl="0" eaLnBrk="1" fontAlgn="auto" latinLnBrk="0" hangingPunct="1">
+              <a:lnSpc>
+                <a:spcPct val="100000"/>
+              </a:lnSpc>
+              <a:spcBef>
+                <a:spcPts val="400"/>
+              </a:spcBef>
+              <a:spcAft>
+                <a:spcPts val="0"/>
+              </a:spcAft>
+              <a:buClr>
+                <a:schemeClr val="accent1"/>
+              </a:buClr>
+              <a:buSzPct val="68000"/>
+              <a:buFont typeface="Wingdings" pitchFamily="2" charset="2"/>
+              <a:buChar char="§"/>
+              <a:tabLst/>
+              <a:defRPr/>
+            </a:pPr>
+            <a:r>
+              <a:rPr lang="en-US" sz="2800" noProof="0" dirty="0" smtClean="0"/>
+              <a:t>Server application</a:t>
+            </a:r>
+            <a:endParaRPr lang="en-US" sz="2800" noProof="0" dirty="0" smtClean="0"/>
+          </a:p>
+          <a:p>
+            <a:pPr marL="365760" marR="0" lvl="0" indent="-256032" defTabSz="914400" rtl="0" eaLnBrk="1" fontAlgn="auto" latinLnBrk="0" hangingPunct="1">
+              <a:lnSpc>
+                <a:spcPct val="100000"/>
+              </a:lnSpc>
+              <a:spcBef>
+                <a:spcPts val="400"/>
+              </a:spcBef>
+              <a:spcAft>
+                <a:spcPts val="0"/>
+              </a:spcAft>
+              <a:buClr>
+                <a:schemeClr val="accent1"/>
+              </a:buClr>
+              <a:buSzPct val="68000"/>
+              <a:buFont typeface="Wingdings" pitchFamily="2" charset="2"/>
+              <a:buChar char="§"/>
+              <a:tabLst/>
+              <a:defRPr/>
+            </a:pPr>
+            <a:r>
+              <a:rPr kumimoji="0" lang="en-US" sz="2800" b="0" i="0" strike="noStrike" kern="1200" cap="none" spc="0" normalizeH="0" baseline="0" dirty="0" smtClean="0">
+                <a:ln>
+                  <a:noFill/>
+                </a:ln>
+                <a:solidFill>
+                  <a:schemeClr val="tx1"/>
+                </a:solidFill>
+                <a:effectLst/>
+                <a:uLnTx/>
+                <a:uFillTx/>
+                <a:latin typeface="+mn-lt"/>
+                <a:ea typeface="+mn-ea"/>
+                <a:cs typeface="+mn-cs"/>
+              </a:rPr>
+              <a:t>Web</a:t>
+            </a:r>
+            <a:r>
+              <a:rPr kumimoji="0" lang="en-US" sz="2800" b="0" i="0" strike="noStrike" kern="1200" cap="none" spc="0" normalizeH="0" dirty="0" smtClean="0">
+                <a:ln>
+                  <a:noFill/>
+                </a:ln>
+                <a:solidFill>
+                  <a:schemeClr val="tx1"/>
+                </a:solidFill>
+                <a:effectLst/>
+                <a:uLnTx/>
+                <a:uFillTx/>
+                <a:latin typeface="+mn-lt"/>
+                <a:ea typeface="+mn-ea"/>
+                <a:cs typeface="+mn-cs"/>
+              </a:rPr>
+              <a:t> and database server</a:t>
+            </a:r>
+            <a:endParaRPr kumimoji="0" lang="en-US" sz="2800" b="0" i="0" strike="noStrike" kern="1200" cap="none" spc="0" normalizeH="0" dirty="0" smtClean="0">
+              <a:ln>
+                <a:noFill/>
+              </a:ln>
+              <a:solidFill>
+                <a:schemeClr val="tx1"/>
+              </a:solidFill>
+              <a:effectLst/>
+              <a:uLnTx/>
+              <a:uFillTx/>
+              <a:latin typeface="+mn-lt"/>
+              <a:ea typeface="+mn-ea"/>
+              <a:cs typeface="+mn-cs"/>
+            </a:endParaRPr>
+          </a:p>
+          <a:p>
+            <a:pPr marL="365760" marR="0" lvl="0" indent="-256032" defTabSz="914400" rtl="0" eaLnBrk="1" fontAlgn="auto" latinLnBrk="0" hangingPunct="1">
+              <a:lnSpc>
+                <a:spcPct val="100000"/>
+              </a:lnSpc>
+              <a:spcBef>
+                <a:spcPts val="400"/>
+              </a:spcBef>
+              <a:spcAft>
+                <a:spcPts val="0"/>
+              </a:spcAft>
+              <a:buClr>
+                <a:schemeClr val="accent1"/>
+              </a:buClr>
+              <a:buSzPct val="68000"/>
+              <a:buFont typeface="Wingdings" pitchFamily="2" charset="2"/>
+              <a:buChar char="§"/>
+              <a:tabLst/>
+              <a:defRPr/>
+            </a:pPr>
+            <a:r>
+              <a:rPr lang="en-US" sz="2800" baseline="0" noProof="0" dirty="0" smtClean="0"/>
+              <a:t>Control protocol</a:t>
+            </a:r>
+          </a:p>
+          <a:p>
+            <a:pPr marL="365760" marR="0" lvl="0" indent="-256032" defTabSz="914400" rtl="0" eaLnBrk="1" fontAlgn="auto" latinLnBrk="0" hangingPunct="1">
+              <a:lnSpc>
+                <a:spcPct val="100000"/>
+              </a:lnSpc>
+              <a:spcBef>
+                <a:spcPts val="400"/>
+              </a:spcBef>
+              <a:spcAft>
+                <a:spcPts val="0"/>
+              </a:spcAft>
+              <a:buClr>
+                <a:schemeClr val="accent1"/>
+              </a:buClr>
+              <a:buSzPct val="68000"/>
+              <a:buFont typeface="Wingdings" pitchFamily="2" charset="2"/>
+              <a:buChar char="§"/>
+              <a:tabLst/>
+              <a:defRPr/>
+            </a:pPr>
+            <a:r>
+              <a:rPr kumimoji="0" lang="en-US" sz="2800" b="0" i="0" strike="noStrike" kern="1200" cap="none" spc="0" normalizeH="0" baseline="0" noProof="0" dirty="0" smtClean="0">
+                <a:ln>
+                  <a:noFill/>
+                </a:ln>
+                <a:solidFill>
+                  <a:schemeClr val="tx1"/>
+                </a:solidFill>
+                <a:effectLst/>
+                <a:uLnTx/>
+                <a:uFillTx/>
+                <a:latin typeface="+mn-lt"/>
+                <a:ea typeface="+mn-ea"/>
+                <a:cs typeface="+mn-cs"/>
+              </a:rPr>
+              <a:t>System </a:t>
+            </a:r>
+            <a:r>
+              <a:rPr kumimoji="0" lang="en-US" sz="2800" b="0" i="0" strike="noStrike" kern="1200" cap="none" spc="0" normalizeH="0" baseline="0" noProof="0" dirty="0" smtClean="0">
+                <a:ln>
+                  <a:noFill/>
+                </a:ln>
+                <a:solidFill>
+                  <a:schemeClr val="tx1"/>
+                </a:solidFill>
+                <a:effectLst/>
+                <a:uLnTx/>
+                <a:uFillTx/>
+                <a:latin typeface="+mn-lt"/>
+                <a:ea typeface="+mn-ea"/>
+                <a:cs typeface="+mn-cs"/>
+              </a:rPr>
+              <a:t>architecture</a:t>
+            </a:r>
+          </a:p>
+          <a:p>
+            <a:pPr marL="365760" marR="0" lvl="0" indent="-256032" defTabSz="914400" rtl="0" eaLnBrk="1" fontAlgn="auto" latinLnBrk="0" hangingPunct="1">
+              <a:lnSpc>
+                <a:spcPct val="100000"/>
+              </a:lnSpc>
+              <a:spcBef>
+                <a:spcPts val="400"/>
+              </a:spcBef>
+              <a:spcAft>
+                <a:spcPts val="0"/>
+              </a:spcAft>
+              <a:buClr>
+                <a:schemeClr val="accent1"/>
+              </a:buClr>
+              <a:buSzPct val="68000"/>
+              <a:buFont typeface="Wingdings" pitchFamily="2" charset="2"/>
+              <a:buChar char="§"/>
+              <a:tabLst/>
+              <a:defRPr/>
+            </a:pPr>
+            <a:r>
+              <a:rPr lang="en-US" sz="2800" noProof="0" dirty="0" smtClean="0"/>
+              <a:t>Simulation tools</a:t>
+            </a:r>
+          </a:p>
+          <a:p>
+            <a:pPr marL="109728" marR="0" lvl="0" defTabSz="914400" rtl="0" eaLnBrk="1" fontAlgn="auto" latinLnBrk="0" hangingPunct="1">
+              <a:lnSpc>
+                <a:spcPct val="100000"/>
+              </a:lnSpc>
+              <a:spcBef>
+                <a:spcPts val="400"/>
+              </a:spcBef>
+              <a:spcAft>
+                <a:spcPts val="0"/>
+              </a:spcAft>
+              <a:buClr>
+                <a:schemeClr val="accent1"/>
+              </a:buClr>
+              <a:buSzPct val="68000"/>
+              <a:tabLst/>
+              <a:defRPr/>
+            </a:pPr>
+            <a:endParaRPr kumimoji="0" lang="en-US" sz="2800" b="0" i="0" strike="noStrike" kern="1200" cap="none" spc="0" normalizeH="0" baseline="0" noProof="0" dirty="0" smtClean="0">
+              <a:ln>
+                <a:noFill/>
+              </a:ln>
+              <a:solidFill>
+                <a:schemeClr val="tx1"/>
+              </a:solidFill>
+              <a:effectLst/>
+              <a:uLnTx/>
+              <a:uFillTx/>
+              <a:latin typeface="+mn-lt"/>
+              <a:ea typeface="+mn-ea"/>
+              <a:cs typeface="+mn-cs"/>
+            </a:endParaRPr>
+          </a:p>
+          <a:p>
+            <a:pPr marL="365760" marR="0" lvl="0" indent="-256032" defTabSz="914400" rtl="0" eaLnBrk="1" fontAlgn="auto" latinLnBrk="0" hangingPunct="1">
+              <a:lnSpc>
+                <a:spcPct val="100000"/>
+              </a:lnSpc>
+              <a:spcBef>
+                <a:spcPts val="400"/>
+              </a:spcBef>
+              <a:spcAft>
+                <a:spcPts val="0"/>
+              </a:spcAft>
+              <a:buClr>
+                <a:schemeClr val="accent1"/>
+              </a:buClr>
+              <a:buSzPct val="68000"/>
+              <a:buFont typeface="Wingdings" pitchFamily="2" charset="2"/>
+              <a:buChar char="§"/>
+              <a:tabLst/>
+              <a:defRPr/>
+            </a:pPr>
+            <a:endParaRPr kumimoji="0" lang="en-US" sz="2800" b="0" i="0" strike="noStrike" kern="1200" cap="none" spc="0" normalizeH="0" baseline="0" noProof="0" dirty="0" smtClean="0">
+              <a:ln>
+                <a:noFill/>
+              </a:ln>
+              <a:solidFill>
+                <a:schemeClr val="tx1"/>
+              </a:solidFill>
+              <a:effectLst/>
+              <a:uLnTx/>
+              <a:uFillTx/>
+              <a:latin typeface="+mn-lt"/>
+              <a:ea typeface="+mn-ea"/>
+              <a:cs typeface="+mn-cs"/>
+            </a:endParaRPr>
+          </a:p>
+        </p:txBody>
+      </p:sp>
+    </p:spTree>
+    <p:extLst>
+      <p:ext uri="{BB962C8B-B14F-4D97-AF65-F5344CB8AC3E}">
+        <p14:creationId xmlns:p14="http://schemas.microsoft.com/office/powerpoint/2010/main" val="1883923485"/>
+      </p:ext>
+    </p:extLst>
+  </p:cSld>
+  <p:clrMapOvr>
+    <a:masterClrMapping/>
+  </p:clrMapOvr>
+  <p:timing>
+    <p:tnLst>
+      <p:par>
+        <p:cTn xmlns:p14="http://schemas.microsoft.com/office/powerpoint/2010/main" id="1" dur="indefinite" restart="never" nodeType="tmRoot"/>
+      </p:par>
+    </p:tnLst>
+  </p:timing>
+</p:sld>
+</file>
+
 <file path=ppt/slides/slide2.xml><?xml version="1.0" encoding="utf-8"?>
 <p:sld xmlns:a="http://schemas.openxmlformats.org/drawingml/2006/main" xmlns:r="http://schemas.openxmlformats.org/officeDocument/2006/relationships" xmlns:p="http://schemas.openxmlformats.org/presentationml/2006/main">
   <p:cSld>
@@ -5721,6 +6209,310 @@
       </p:par>
     </p:tnLst>
   </p:timing>
+</p:sld>
+</file>
+
+<file path=ppt/slides/slide7.xml><?xml version="1.0" encoding="utf-8"?>
+<p:sld xmlns:a="http://schemas.openxmlformats.org/drawingml/2006/main" xmlns:r="http://schemas.openxmlformats.org/officeDocument/2006/relationships" xmlns:p="http://schemas.openxmlformats.org/presentationml/2006/main">
+  <p:cSld>
+    <p:spTree>
+      <p:nvGrpSpPr>
+        <p:cNvPr id="1" name=""/>
+        <p:cNvGrpSpPr/>
+        <p:nvPr/>
+      </p:nvGrpSpPr>
+      <p:grpSpPr>
+        <a:xfrm>
+          <a:off x="0" y="0"/>
+          <a:ext cx="0" cy="0"/>
+          <a:chOff x="0" y="0"/>
+          <a:chExt cx="0" cy="0"/>
+        </a:xfrm>
+      </p:grpSpPr>
+      <p:sp>
+        <p:nvSpPr>
+          <p:cNvPr id="3" name="Title 2"/>
+          <p:cNvSpPr>
+            <a:spLocks noGrp="1"/>
+          </p:cNvSpPr>
+          <p:nvPr>
+            <p:ph type="title"/>
+          </p:nvPr>
+        </p:nvSpPr>
+        <p:spPr/>
+        <p:txBody>
+          <a:bodyPr/>
+          <a:lstStyle/>
+          <a:p>
+            <a:r>
+              <a:rPr lang="en-US" dirty="0" smtClean="0"/>
+              <a:t>Server Architecture</a:t>
+            </a:r>
+            <a:endParaRPr lang="en-US" dirty="0"/>
+          </a:p>
+        </p:txBody>
+      </p:sp>
+      <p:pic>
+        <p:nvPicPr>
+          <p:cNvPr id="6" name="Picture 5" descr="CMPE146_195 Project.png"/>
+          <p:cNvPicPr>
+            <a:picLocks noChangeAspect="1"/>
+          </p:cNvPicPr>
+          <p:nvPr/>
+        </p:nvPicPr>
+        <p:blipFill>
+          <a:blip r:embed="rId2">
+            <a:extLst>
+              <a:ext uri="{28A0092B-C50C-407E-A947-70E740481C1C}">
+                <a14:useLocalDpi xmlns:a14="http://schemas.microsoft.com/office/drawing/2010/main" val="0"/>
+              </a:ext>
+            </a:extLst>
+          </a:blip>
+          <a:stretch>
+            <a:fillRect/>
+          </a:stretch>
+        </p:blipFill>
+        <p:spPr>
+          <a:xfrm>
+            <a:off x="609600" y="1219200"/>
+            <a:ext cx="8305800" cy="5106318"/>
+          </a:xfrm>
+          <a:prstGeom prst="rect">
+            <a:avLst/>
+          </a:prstGeom>
+        </p:spPr>
+      </p:pic>
+    </p:spTree>
+    <p:extLst>
+      <p:ext uri="{BB962C8B-B14F-4D97-AF65-F5344CB8AC3E}">
+        <p14:creationId xmlns:p14="http://schemas.microsoft.com/office/powerpoint/2010/main" val="1009322973"/>
+      </p:ext>
+    </p:extLst>
+  </p:cSld>
+  <p:clrMapOvr>
+    <a:masterClrMapping/>
+  </p:clrMapOvr>
+</p:sld>
+</file>
+
+<file path=ppt/slides/slide8.xml><?xml version="1.0" encoding="utf-8"?>
+<p:sld xmlns:a="http://schemas.openxmlformats.org/drawingml/2006/main" xmlns:r="http://schemas.openxmlformats.org/officeDocument/2006/relationships" xmlns:p="http://schemas.openxmlformats.org/presentationml/2006/main">
+  <p:cSld>
+    <p:spTree>
+      <p:nvGrpSpPr>
+        <p:cNvPr id="1" name=""/>
+        <p:cNvGrpSpPr/>
+        <p:nvPr/>
+      </p:nvGrpSpPr>
+      <p:grpSpPr>
+        <a:xfrm>
+          <a:off x="0" y="0"/>
+          <a:ext cx="0" cy="0"/>
+          <a:chOff x="0" y="0"/>
+          <a:chExt cx="0" cy="0"/>
+        </a:xfrm>
+      </p:grpSpPr>
+      <p:sp>
+        <p:nvSpPr>
+          <p:cNvPr id="2" name="Content Placeholder 1"/>
+          <p:cNvSpPr>
+            <a:spLocks noGrp="1"/>
+          </p:cNvSpPr>
+          <p:nvPr>
+            <p:ph idx="1"/>
+          </p:nvPr>
+        </p:nvSpPr>
+        <p:spPr/>
+        <p:txBody>
+          <a:bodyPr/>
+          <a:lstStyle/>
+          <a:p>
+            <a:r>
+              <a:rPr lang="en-US" dirty="0" smtClean="0"/>
+              <a:t>- custom server application to handle clients and devices</a:t>
+            </a:r>
+          </a:p>
+          <a:p>
+            <a:r>
+              <a:rPr lang="en-US" dirty="0" smtClean="0"/>
+              <a:t>- Apache HTTP web server to web clients</a:t>
+            </a:r>
+          </a:p>
+          <a:p>
+            <a:r>
+              <a:rPr lang="en-US" dirty="0" smtClean="0"/>
+              <a:t>- MySQL for database	</a:t>
+            </a:r>
+          </a:p>
+          <a:p>
+            <a:pPr lvl="1"/>
+            <a:r>
+              <a:rPr lang="en-US" dirty="0" smtClean="0"/>
+              <a:t>Using </a:t>
+            </a:r>
+            <a:r>
+              <a:rPr lang="en-US" dirty="0" err="1" smtClean="0"/>
+              <a:t>InnoDB</a:t>
+            </a:r>
+            <a:r>
+              <a:rPr lang="en-US" dirty="0" smtClean="0"/>
+              <a:t> for database engine since it supports foreign keys, and we don’t need full text indexing</a:t>
+            </a:r>
+          </a:p>
+        </p:txBody>
+      </p:sp>
+      <p:sp>
+        <p:nvSpPr>
+          <p:cNvPr id="3" name="Title 2"/>
+          <p:cNvSpPr>
+            <a:spLocks noGrp="1"/>
+          </p:cNvSpPr>
+          <p:nvPr>
+            <p:ph type="title"/>
+          </p:nvPr>
+        </p:nvSpPr>
+        <p:spPr/>
+        <p:txBody>
+          <a:bodyPr>
+            <a:normAutofit/>
+          </a:bodyPr>
+          <a:lstStyle/>
+          <a:p>
+            <a:r>
+              <a:rPr lang="en-US" dirty="0" smtClean="0"/>
+              <a:t>Server Architecture</a:t>
+            </a:r>
+            <a:endParaRPr lang="en-US" dirty="0"/>
+          </a:p>
+        </p:txBody>
+      </p:sp>
+    </p:spTree>
+    <p:extLst>
+      <p:ext uri="{BB962C8B-B14F-4D97-AF65-F5344CB8AC3E}">
+        <p14:creationId xmlns:p14="http://schemas.microsoft.com/office/powerpoint/2010/main" val="1751939432"/>
+      </p:ext>
+    </p:extLst>
+  </p:cSld>
+  <p:clrMapOvr>
+    <a:masterClrMapping/>
+  </p:clrMapOvr>
+</p:sld>
+</file>
+
+<file path=ppt/slides/slide9.xml><?xml version="1.0" encoding="utf-8"?>
+<p:sld xmlns:a="http://schemas.openxmlformats.org/drawingml/2006/main" xmlns:r="http://schemas.openxmlformats.org/officeDocument/2006/relationships" xmlns:p="http://schemas.openxmlformats.org/presentationml/2006/main">
+  <p:cSld>
+    <p:spTree>
+      <p:nvGrpSpPr>
+        <p:cNvPr id="1" name=""/>
+        <p:cNvGrpSpPr/>
+        <p:nvPr/>
+      </p:nvGrpSpPr>
+      <p:grpSpPr>
+        <a:xfrm>
+          <a:off x="0" y="0"/>
+          <a:ext cx="0" cy="0"/>
+          <a:chOff x="0" y="0"/>
+          <a:chExt cx="0" cy="0"/>
+        </a:xfrm>
+      </p:grpSpPr>
+      <p:sp>
+        <p:nvSpPr>
+          <p:cNvPr id="2" name="Content Placeholder 1"/>
+          <p:cNvSpPr>
+            <a:spLocks noGrp="1"/>
+          </p:cNvSpPr>
+          <p:nvPr>
+            <p:ph idx="1"/>
+          </p:nvPr>
+        </p:nvSpPr>
+        <p:spPr/>
+        <p:txBody>
+          <a:bodyPr/>
+          <a:lstStyle/>
+          <a:p>
+            <a:r>
+              <a:rPr lang="en-US" dirty="0" smtClean="0"/>
+              <a:t>Design:</a:t>
+            </a:r>
+          </a:p>
+          <a:p>
+            <a:pPr lvl="1"/>
+            <a:r>
+              <a:rPr lang="en-US" dirty="0" smtClean="0"/>
+              <a:t>Server application based off classical thread model</a:t>
+            </a:r>
+          </a:p>
+          <a:p>
+            <a:pPr lvl="1"/>
+            <a:r>
+              <a:rPr lang="en-US" dirty="0" smtClean="0"/>
+              <a:t>While it does not scale as well compared to asynchronous, it’s better suited to demonstrate a prototype</a:t>
+            </a:r>
+          </a:p>
+          <a:p>
+            <a:r>
+              <a:rPr lang="en-US" dirty="0" smtClean="0"/>
+              <a:t>Design trade off:</a:t>
+            </a:r>
+          </a:p>
+          <a:p>
+            <a:pPr lvl="1"/>
+            <a:r>
+              <a:rPr lang="en-US" dirty="0" smtClean="0"/>
+              <a:t>Server was planned to utilize asynchronous framework to improve scalability and efficiency</a:t>
+            </a:r>
+          </a:p>
+          <a:p>
+            <a:pPr lvl="1"/>
+            <a:r>
+              <a:rPr lang="en-US" dirty="0" smtClean="0"/>
+              <a:t>However we decided the time and effort required to design, implement, and test the system would be beyond the demand of the project</a:t>
+            </a:r>
+          </a:p>
+          <a:p>
+            <a:pPr marL="109728" indent="0">
+              <a:buNone/>
+            </a:pPr>
+            <a:endParaRPr lang="en-US" dirty="0" smtClean="0"/>
+          </a:p>
+        </p:txBody>
+      </p:sp>
+      <p:sp>
+        <p:nvSpPr>
+          <p:cNvPr id="3" name="Title 2"/>
+          <p:cNvSpPr>
+            <a:spLocks noGrp="1"/>
+          </p:cNvSpPr>
+          <p:nvPr>
+            <p:ph type="title"/>
+          </p:nvPr>
+        </p:nvSpPr>
+        <p:spPr/>
+        <p:txBody>
+          <a:bodyPr>
+            <a:normAutofit/>
+          </a:bodyPr>
+          <a:lstStyle/>
+          <a:p>
+            <a:r>
+              <a:rPr lang="en-US" dirty="0" smtClean="0"/>
+              <a:t>Server Architecture</a:t>
+            </a:r>
+            <a:endParaRPr lang="en-US" dirty="0"/>
+          </a:p>
+        </p:txBody>
+      </p:sp>
+    </p:spTree>
+    <p:extLst>
+      <p:ext uri="{BB962C8B-B14F-4D97-AF65-F5344CB8AC3E}">
+        <p14:creationId xmlns:p14="http://schemas.microsoft.com/office/powerpoint/2010/main" val="411968327"/>
+      </p:ext>
+    </p:extLst>
+  </p:cSld>
+  <p:clrMapOvr>
+    <a:masterClrMapping/>
+  </p:clrMapOvr>
 </p:sld>
 </file>
 

</xml_diff>

<commit_message>
add final_presentation_candidate, slides unordered
</commit_message>
<xml_diff>
--- a/docs/final_presentation_tmas.pptx
+++ b/docs/final_presentation_tmas.pptx
@@ -14,7 +14,10 @@
     <p:sldId id="262" r:id="rId8"/>
     <p:sldId id="263" r:id="rId9"/>
     <p:sldId id="265" r:id="rId10"/>
-    <p:sldId id="264" r:id="rId11"/>
+    <p:sldId id="266" r:id="rId11"/>
+    <p:sldId id="268" r:id="rId12"/>
+    <p:sldId id="267" r:id="rId13"/>
+    <p:sldId id="264" r:id="rId14"/>
   </p:sldIdLst>
   <p:sldSz cx="9144000" cy="6858000" type="screen4x3"/>
   <p:notesSz cx="6858000" cy="9144000"/>
@@ -4898,6 +4901,269 @@
             <p:ph idx="1"/>
           </p:nvPr>
         </p:nvSpPr>
+        <p:spPr/>
+        <p:txBody>
+          <a:bodyPr/>
+          <a:lstStyle/>
+          <a:p>
+            <a:r>
+              <a:rPr lang="en-US" dirty="0" smtClean="0"/>
+              <a:t>When a client or device connects to the server, a new thread is spawn to handle and process any data sent</a:t>
+            </a:r>
+          </a:p>
+          <a:p>
+            <a:r>
+              <a:rPr lang="en-US" dirty="0" smtClean="0"/>
+              <a:t>Once determined if it’s a client or device, the information is logged into a list, which is constantly updated locally and periodically updated on the database </a:t>
+            </a:r>
+          </a:p>
+          <a:p>
+            <a:r>
+              <a:rPr lang="en-US" dirty="0" smtClean="0"/>
+              <a:t>Client asks the server to assign it a device, once assigned, the server will relay any data from the client to the device</a:t>
+            </a:r>
+            <a:endParaRPr lang="en-US" dirty="0"/>
+          </a:p>
+        </p:txBody>
+      </p:sp>
+      <p:sp>
+        <p:nvSpPr>
+          <p:cNvPr id="3" name="Title 2"/>
+          <p:cNvSpPr>
+            <a:spLocks noGrp="1"/>
+          </p:cNvSpPr>
+          <p:nvPr>
+            <p:ph type="title"/>
+          </p:nvPr>
+        </p:nvSpPr>
+        <p:spPr/>
+        <p:txBody>
+          <a:bodyPr>
+            <a:normAutofit/>
+          </a:bodyPr>
+          <a:lstStyle/>
+          <a:p>
+            <a:r>
+              <a:rPr lang="en-US" dirty="0" smtClean="0"/>
+              <a:t>Server Implementation</a:t>
+            </a:r>
+            <a:endParaRPr lang="en-US" dirty="0"/>
+          </a:p>
+        </p:txBody>
+      </p:sp>
+    </p:spTree>
+    <p:extLst>
+      <p:ext uri="{BB962C8B-B14F-4D97-AF65-F5344CB8AC3E}">
+        <p14:creationId xmlns:p14="http://schemas.microsoft.com/office/powerpoint/2010/main" val="3717881349"/>
+      </p:ext>
+    </p:extLst>
+  </p:cSld>
+  <p:clrMapOvr>
+    <a:masterClrMapping/>
+  </p:clrMapOvr>
+</p:sld>
+</file>
+
+<file path=ppt/slides/slide11.xml><?xml version="1.0" encoding="utf-8"?>
+<p:sld xmlns:a="http://schemas.openxmlformats.org/drawingml/2006/main" xmlns:r="http://schemas.openxmlformats.org/officeDocument/2006/relationships" xmlns:p="http://schemas.openxmlformats.org/presentationml/2006/main">
+  <p:cSld>
+    <p:spTree>
+      <p:nvGrpSpPr>
+        <p:cNvPr id="1" name=""/>
+        <p:cNvGrpSpPr/>
+        <p:nvPr/>
+      </p:nvGrpSpPr>
+      <p:grpSpPr>
+        <a:xfrm>
+          <a:off x="0" y="0"/>
+          <a:ext cx="0" cy="0"/>
+          <a:chOff x="0" y="0"/>
+          <a:chExt cx="0" cy="0"/>
+        </a:xfrm>
+      </p:grpSpPr>
+      <p:sp>
+        <p:nvSpPr>
+          <p:cNvPr id="2" name="Content Placeholder 1"/>
+          <p:cNvSpPr>
+            <a:spLocks noGrp="1"/>
+          </p:cNvSpPr>
+          <p:nvPr>
+            <p:ph idx="1"/>
+          </p:nvPr>
+        </p:nvSpPr>
+        <p:spPr/>
+        <p:txBody>
+          <a:bodyPr/>
+          <a:lstStyle/>
+          <a:p>
+            <a:r>
+              <a:rPr lang="en-US" dirty="0" smtClean="0"/>
+              <a:t>Server keeps a cached list of available devices and clients</a:t>
+            </a:r>
+          </a:p>
+          <a:p>
+            <a:r>
+              <a:rPr lang="en-US" dirty="0" smtClean="0"/>
+              <a:t>Makes periodic database writes for web and mobile client access</a:t>
+            </a:r>
+          </a:p>
+          <a:p>
+            <a:r>
+              <a:rPr lang="en-US" dirty="0" smtClean="0"/>
+              <a:t>Database writes can be expensive so only done periodically</a:t>
+            </a:r>
+          </a:p>
+          <a:p>
+            <a:r>
+              <a:rPr lang="en-US" dirty="0" smtClean="0"/>
+              <a:t>Internal list needs to be updated in real time so devices aren’t mistakenly claimed</a:t>
+            </a:r>
+            <a:endParaRPr lang="en-US" dirty="0"/>
+          </a:p>
+        </p:txBody>
+      </p:sp>
+      <p:sp>
+        <p:nvSpPr>
+          <p:cNvPr id="3" name="Title 2"/>
+          <p:cNvSpPr>
+            <a:spLocks noGrp="1"/>
+          </p:cNvSpPr>
+          <p:nvPr>
+            <p:ph type="title"/>
+          </p:nvPr>
+        </p:nvSpPr>
+        <p:spPr/>
+        <p:txBody>
+          <a:bodyPr/>
+          <a:lstStyle/>
+          <a:p>
+            <a:r>
+              <a:rPr lang="en-US" dirty="0"/>
+              <a:t>Server Implementation</a:t>
+            </a:r>
+          </a:p>
+        </p:txBody>
+      </p:sp>
+    </p:spTree>
+    <p:extLst>
+      <p:ext uri="{BB962C8B-B14F-4D97-AF65-F5344CB8AC3E}">
+        <p14:creationId xmlns:p14="http://schemas.microsoft.com/office/powerpoint/2010/main" val="1334417220"/>
+      </p:ext>
+    </p:extLst>
+  </p:cSld>
+  <p:clrMapOvr>
+    <a:masterClrMapping/>
+  </p:clrMapOvr>
+</p:sld>
+</file>
+
+<file path=ppt/slides/slide12.xml><?xml version="1.0" encoding="utf-8"?>
+<p:sld xmlns:a="http://schemas.openxmlformats.org/drawingml/2006/main" xmlns:r="http://schemas.openxmlformats.org/officeDocument/2006/relationships" xmlns:p="http://schemas.openxmlformats.org/presentationml/2006/main">
+  <p:cSld>
+    <p:spTree>
+      <p:nvGrpSpPr>
+        <p:cNvPr id="1" name=""/>
+        <p:cNvGrpSpPr/>
+        <p:nvPr/>
+      </p:nvGrpSpPr>
+      <p:grpSpPr>
+        <a:xfrm>
+          <a:off x="0" y="0"/>
+          <a:ext cx="0" cy="0"/>
+          <a:chOff x="0" y="0"/>
+          <a:chExt cx="0" cy="0"/>
+        </a:xfrm>
+      </p:grpSpPr>
+      <p:sp>
+        <p:nvSpPr>
+          <p:cNvPr id="2" name="Content Placeholder 1"/>
+          <p:cNvSpPr>
+            <a:spLocks noGrp="1"/>
+          </p:cNvSpPr>
+          <p:nvPr>
+            <p:ph idx="1"/>
+          </p:nvPr>
+        </p:nvSpPr>
+        <p:spPr/>
+        <p:txBody>
+          <a:bodyPr/>
+          <a:lstStyle/>
+          <a:p>
+            <a:r>
+              <a:rPr lang="en-US" dirty="0" smtClean="0"/>
+              <a:t>Expanding and extending the functionality of the API can be difficult, server can store what available commands exist for a certain device, but the user interface cannot dynamically translate commands into a </a:t>
+            </a:r>
+            <a:r>
+              <a:rPr lang="en-US" smtClean="0"/>
+              <a:t>practical layout </a:t>
+            </a:r>
+            <a:endParaRPr lang="en-US" dirty="0"/>
+          </a:p>
+        </p:txBody>
+      </p:sp>
+      <p:sp>
+        <p:nvSpPr>
+          <p:cNvPr id="3" name="Title 2"/>
+          <p:cNvSpPr>
+            <a:spLocks noGrp="1"/>
+          </p:cNvSpPr>
+          <p:nvPr>
+            <p:ph type="title"/>
+          </p:nvPr>
+        </p:nvSpPr>
+        <p:spPr/>
+        <p:txBody>
+          <a:bodyPr/>
+          <a:lstStyle/>
+          <a:p>
+            <a:r>
+              <a:rPr lang="en-US" dirty="0" smtClean="0"/>
+              <a:t>Server Issues</a:t>
+            </a:r>
+            <a:endParaRPr lang="en-US" dirty="0"/>
+          </a:p>
+        </p:txBody>
+      </p:sp>
+    </p:spTree>
+    <p:extLst>
+      <p:ext uri="{BB962C8B-B14F-4D97-AF65-F5344CB8AC3E}">
+        <p14:creationId xmlns:p14="http://schemas.microsoft.com/office/powerpoint/2010/main" val="480705046"/>
+      </p:ext>
+    </p:extLst>
+  </p:cSld>
+  <p:clrMapOvr>
+    <a:masterClrMapping/>
+  </p:clrMapOvr>
+</p:sld>
+</file>
+
+<file path=ppt/slides/slide13.xml><?xml version="1.0" encoding="utf-8"?>
+<p:sld xmlns:a="http://schemas.openxmlformats.org/drawingml/2006/main" xmlns:r="http://schemas.openxmlformats.org/officeDocument/2006/relationships" xmlns:p="http://schemas.openxmlformats.org/presentationml/2006/main">
+  <p:cSld>
+    <p:spTree>
+      <p:nvGrpSpPr>
+        <p:cNvPr id="1" name=""/>
+        <p:cNvGrpSpPr/>
+        <p:nvPr/>
+      </p:nvGrpSpPr>
+      <p:grpSpPr>
+        <a:xfrm>
+          <a:off x="0" y="0"/>
+          <a:ext cx="0" cy="0"/>
+          <a:chOff x="0" y="0"/>
+          <a:chExt cx="0" cy="0"/>
+        </a:xfrm>
+      </p:grpSpPr>
+      <p:sp>
+        <p:nvSpPr>
+          <p:cNvPr id="2" name="Content Placeholder 1"/>
+          <p:cNvSpPr>
+            <a:spLocks noGrp="1"/>
+          </p:cNvSpPr>
+          <p:nvPr>
+            <p:ph idx="1"/>
+          </p:nvPr>
+        </p:nvSpPr>
         <p:spPr>
           <a:xfrm>
             <a:off x="4495800" y="1481328"/>

</xml_diff>